<commit_message>
Virtual Hosts finalmente funcionais, atualização de relatório e powerpoint
</commit_message>
<xml_diff>
--- a/Presentation/SlidesApresentaçãoProjeto.pptx
+++ b/Presentation/SlidesApresentaçãoProjeto.pptx
@@ -1892,7 +1892,7 @@
         <a:lstStyle/>
         <a:p>
           <a:r>
-            <a:rPr lang="pt-PT" sz="2800" dirty="0"/>
+            <a:rPr lang="pt-PT" sz="2800"/>
             <a:t>Criação de 3 utilizadores (trinta.org, 3emfrente.eu, the.com)</a:t>
           </a:r>
           <a:endParaRPr lang="en-US" sz="2800" dirty="0"/>
@@ -1921,51 +1921,6 @@
         </a:p>
       </dgm:t>
     </dgm:pt>
-    <dgm:pt modelId="{4B0CF132-C0B1-48D7-8296-B0265E2D746B}">
-      <dgm:prSet custT="1"/>
-      <dgm:spPr/>
-      <dgm:t>
-        <a:bodyPr/>
-        <a:lstStyle/>
-        <a:p>
-          <a:r>
-            <a:rPr lang="pt-PT" sz="2800" dirty="0"/>
-            <a:t>Criação da diretoria ‘</a:t>
-          </a:r>
-          <a:r>
-            <a:rPr lang="pt-PT" sz="2800" dirty="0" err="1"/>
-            <a:t>public_html</a:t>
-          </a:r>
-          <a:r>
-            <a:rPr lang="pt-PT" sz="2800" dirty="0"/>
-            <a:t>’</a:t>
-          </a:r>
-          <a:endParaRPr lang="en-US" sz="2800" dirty="0"/>
-        </a:p>
-      </dgm:t>
-    </dgm:pt>
-    <dgm:pt modelId="{4FAB5512-CC16-47AF-82EB-B79D9E5CDD0F}" type="parTrans" cxnId="{F9F49E3A-A8AC-493B-8FE3-D1986BF1F816}">
-      <dgm:prSet/>
-      <dgm:spPr/>
-      <dgm:t>
-        <a:bodyPr/>
-        <a:lstStyle/>
-        <a:p>
-          <a:endParaRPr lang="en-US"/>
-        </a:p>
-      </dgm:t>
-    </dgm:pt>
-    <dgm:pt modelId="{C155C518-3A31-41D9-8DE1-EA41CC9B50D4}" type="sibTrans" cxnId="{F9F49E3A-A8AC-493B-8FE3-D1986BF1F816}">
-      <dgm:prSet/>
-      <dgm:spPr/>
-      <dgm:t>
-        <a:bodyPr/>
-        <a:lstStyle/>
-        <a:p>
-          <a:endParaRPr lang="en-US"/>
-        </a:p>
-      </dgm:t>
-    </dgm:pt>
     <dgm:pt modelId="{2B8068CB-D073-4151-9254-50E9C732DE4F}">
       <dgm:prSet custT="1"/>
       <dgm:spPr/>
@@ -1974,7 +1929,7 @@
         <a:lstStyle/>
         <a:p>
           <a:r>
-            <a:rPr lang="pt-PT" sz="2800" dirty="0"/>
+            <a:rPr lang="pt-PT" sz="2800"/>
             <a:t>Criação de ficheiro ‘index.html’</a:t>
           </a:r>
           <a:endParaRPr lang="en-US" sz="2800" dirty="0"/>
@@ -2013,7 +1968,7 @@
       <dgm:spPr/>
     </dgm:pt>
     <dgm:pt modelId="{AE8B2BB8-81A8-4ABC-BD47-E592CE20F646}" type="pres">
-      <dgm:prSet presAssocID="{42E65A4E-65B3-4BEA-8D0D-64E59626FAEA}" presName="parentText" presStyleLbl="node1" presStyleIdx="0" presStyleCnt="3">
+      <dgm:prSet presAssocID="{42E65A4E-65B3-4BEA-8D0D-64E59626FAEA}" presName="parentText" presStyleLbl="node1" presStyleIdx="0" presStyleCnt="2">
         <dgm:presLayoutVars>
           <dgm:chMax val="0"/>
           <dgm:bulletEnabled val="1"/>
@@ -2025,21 +1980,8 @@
       <dgm:prSet presAssocID="{6662FF75-7869-4C8F-B914-8A1F71E4B037}" presName="spacer" presStyleCnt="0"/>
       <dgm:spPr/>
     </dgm:pt>
-    <dgm:pt modelId="{C13ABA29-EC0A-4897-99A3-1BA2E1C9DC72}" type="pres">
-      <dgm:prSet presAssocID="{4B0CF132-C0B1-48D7-8296-B0265E2D746B}" presName="parentText" presStyleLbl="node1" presStyleIdx="1" presStyleCnt="3">
-        <dgm:presLayoutVars>
-          <dgm:chMax val="0"/>
-          <dgm:bulletEnabled val="1"/>
-        </dgm:presLayoutVars>
-      </dgm:prSet>
-      <dgm:spPr/>
-    </dgm:pt>
-    <dgm:pt modelId="{6F6685BB-9D42-417A-8223-DB946E9EFBAF}" type="pres">
-      <dgm:prSet presAssocID="{C155C518-3A31-41D9-8DE1-EA41CC9B50D4}" presName="spacer" presStyleCnt="0"/>
-      <dgm:spPr/>
-    </dgm:pt>
     <dgm:pt modelId="{84117C14-5A47-4CB2-8553-F4D0C3D2E9D3}" type="pres">
-      <dgm:prSet presAssocID="{2B8068CB-D073-4151-9254-50E9C732DE4F}" presName="parentText" presStyleLbl="node1" presStyleIdx="2" presStyleCnt="3">
+      <dgm:prSet presAssocID="{2B8068CB-D073-4151-9254-50E9C732DE4F}" presName="parentText" presStyleLbl="node1" presStyleIdx="1" presStyleCnt="2">
         <dgm:presLayoutVars>
           <dgm:chMax val="0"/>
           <dgm:bulletEnabled val="1"/>
@@ -2049,18 +1991,14 @@
     </dgm:pt>
   </dgm:ptLst>
   <dgm:cxnLst>
-    <dgm:cxn modelId="{F9F49E3A-A8AC-493B-8FE3-D1986BF1F816}" srcId="{EE23037F-FC2B-43C1-B0F0-B27AD3868204}" destId="{4B0CF132-C0B1-48D7-8296-B0265E2D746B}" srcOrd="1" destOrd="0" parTransId="{4FAB5512-CC16-47AF-82EB-B79D9E5CDD0F}" sibTransId="{C155C518-3A31-41D9-8DE1-EA41CC9B50D4}"/>
-    <dgm:cxn modelId="{17F94769-FDEA-4DED-9A56-42BF4106A38D}" type="presOf" srcId="{EE23037F-FC2B-43C1-B0F0-B27AD3868204}" destId="{F491D090-79A8-4325-AE34-3A929128C64C}" srcOrd="0" destOrd="0" presId="urn:microsoft.com/office/officeart/2005/8/layout/vList2"/>
-    <dgm:cxn modelId="{525B8083-237A-4C63-B814-EC0075533D51}" type="presOf" srcId="{4B0CF132-C0B1-48D7-8296-B0265E2D746B}" destId="{C13ABA29-EC0A-4897-99A3-1BA2E1C9DC72}" srcOrd="0" destOrd="0" presId="urn:microsoft.com/office/officeart/2005/8/layout/vList2"/>
+    <dgm:cxn modelId="{62F2FD09-B908-43E9-A3D4-EC7378CA5868}" type="presOf" srcId="{2B8068CB-D073-4151-9254-50E9C732DE4F}" destId="{84117C14-5A47-4CB2-8553-F4D0C3D2E9D3}" srcOrd="0" destOrd="0" presId="urn:microsoft.com/office/officeart/2005/8/layout/vList2"/>
     <dgm:cxn modelId="{CCAABD86-1515-4922-9012-49E7FC0A9481}" srcId="{EE23037F-FC2B-43C1-B0F0-B27AD3868204}" destId="{42E65A4E-65B3-4BEA-8D0D-64E59626FAEA}" srcOrd="0" destOrd="0" parTransId="{30B389F9-564B-46D5-AD2C-AC00BE512025}" sibTransId="{6662FF75-7869-4C8F-B914-8A1F71E4B037}"/>
-    <dgm:cxn modelId="{1A9AACAD-9445-407A-A2F4-6D8E4E4C095B}" type="presOf" srcId="{42E65A4E-65B3-4BEA-8D0D-64E59626FAEA}" destId="{AE8B2BB8-81A8-4ABC-BD47-E592CE20F646}" srcOrd="0" destOrd="0" presId="urn:microsoft.com/office/officeart/2005/8/layout/vList2"/>
-    <dgm:cxn modelId="{458BBDB6-572A-465C-8FDA-3AAE4ABED144}" srcId="{EE23037F-FC2B-43C1-B0F0-B27AD3868204}" destId="{2B8068CB-D073-4151-9254-50E9C732DE4F}" srcOrd="2" destOrd="0" parTransId="{7C04799B-772D-4BC2-B461-D6827215E71C}" sibTransId="{B608E7DB-5B1D-4F96-B12F-AD779B1EEC11}"/>
-    <dgm:cxn modelId="{8E80DAF9-BC88-4155-926B-5BDB40C2A212}" type="presOf" srcId="{2B8068CB-D073-4151-9254-50E9C732DE4F}" destId="{84117C14-5A47-4CB2-8553-F4D0C3D2E9D3}" srcOrd="0" destOrd="0" presId="urn:microsoft.com/office/officeart/2005/8/layout/vList2"/>
-    <dgm:cxn modelId="{02E7278A-2390-43DD-83F2-F423F9600F42}" type="presParOf" srcId="{F491D090-79A8-4325-AE34-3A929128C64C}" destId="{AE8B2BB8-81A8-4ABC-BD47-E592CE20F646}" srcOrd="0" destOrd="0" presId="urn:microsoft.com/office/officeart/2005/8/layout/vList2"/>
-    <dgm:cxn modelId="{B3A3F6F6-0A43-410E-B47A-D04CF21EBD7B}" type="presParOf" srcId="{F491D090-79A8-4325-AE34-3A929128C64C}" destId="{C4A0E675-0D42-416E-8790-FBB30E1DFD30}" srcOrd="1" destOrd="0" presId="urn:microsoft.com/office/officeart/2005/8/layout/vList2"/>
-    <dgm:cxn modelId="{421A3449-A6A9-4718-B8B1-F04022D94900}" type="presParOf" srcId="{F491D090-79A8-4325-AE34-3A929128C64C}" destId="{C13ABA29-EC0A-4897-99A3-1BA2E1C9DC72}" srcOrd="2" destOrd="0" presId="urn:microsoft.com/office/officeart/2005/8/layout/vList2"/>
-    <dgm:cxn modelId="{1EA24269-A6B5-4230-9A7D-E61A3F6AB03F}" type="presParOf" srcId="{F491D090-79A8-4325-AE34-3A929128C64C}" destId="{6F6685BB-9D42-417A-8223-DB946E9EFBAF}" srcOrd="3" destOrd="0" presId="urn:microsoft.com/office/officeart/2005/8/layout/vList2"/>
-    <dgm:cxn modelId="{AF1CF7BF-D7DC-472C-BFF2-48E358553CAC}" type="presParOf" srcId="{F491D090-79A8-4325-AE34-3A929128C64C}" destId="{84117C14-5A47-4CB2-8553-F4D0C3D2E9D3}" srcOrd="4" destOrd="0" presId="urn:microsoft.com/office/officeart/2005/8/layout/vList2"/>
+    <dgm:cxn modelId="{6A2894AC-D1DE-4414-BE40-DB557B3CAF9E}" type="presOf" srcId="{EE23037F-FC2B-43C1-B0F0-B27AD3868204}" destId="{F491D090-79A8-4325-AE34-3A929128C64C}" srcOrd="0" destOrd="0" presId="urn:microsoft.com/office/officeart/2005/8/layout/vList2"/>
+    <dgm:cxn modelId="{E153D9AD-5582-4AB8-ADA6-0EF3974ED372}" type="presOf" srcId="{42E65A4E-65B3-4BEA-8D0D-64E59626FAEA}" destId="{AE8B2BB8-81A8-4ABC-BD47-E592CE20F646}" srcOrd="0" destOrd="0" presId="urn:microsoft.com/office/officeart/2005/8/layout/vList2"/>
+    <dgm:cxn modelId="{458BBDB6-572A-465C-8FDA-3AAE4ABED144}" srcId="{EE23037F-FC2B-43C1-B0F0-B27AD3868204}" destId="{2B8068CB-D073-4151-9254-50E9C732DE4F}" srcOrd="1" destOrd="0" parTransId="{7C04799B-772D-4BC2-B461-D6827215E71C}" sibTransId="{B608E7DB-5B1D-4F96-B12F-AD779B1EEC11}"/>
+    <dgm:cxn modelId="{F2232ED8-FBCC-4E67-A991-1420F7BB5107}" type="presParOf" srcId="{F491D090-79A8-4325-AE34-3A929128C64C}" destId="{AE8B2BB8-81A8-4ABC-BD47-E592CE20F646}" srcOrd="0" destOrd="0" presId="urn:microsoft.com/office/officeart/2005/8/layout/vList2"/>
+    <dgm:cxn modelId="{109B23F6-1A69-4F67-85CD-2737565425F7}" type="presParOf" srcId="{F491D090-79A8-4325-AE34-3A929128C64C}" destId="{C4A0E675-0D42-416E-8790-FBB30E1DFD30}" srcOrd="1" destOrd="0" presId="urn:microsoft.com/office/officeart/2005/8/layout/vList2"/>
+    <dgm:cxn modelId="{AA5AE64E-C017-41BA-B7D5-E21D14B2F7BF}" type="presParOf" srcId="{F491D090-79A8-4325-AE34-3A929128C64C}" destId="{84117C14-5A47-4CB2-8553-F4D0C3D2E9D3}" srcOrd="2" destOrd="0" presId="urn:microsoft.com/office/officeart/2005/8/layout/vList2"/>
   </dgm:cxnLst>
   <dgm:bg/>
   <dgm:whole/>
@@ -2499,7 +2437,7 @@
       </dsp:nvSpPr>
       <dsp:spPr>
         <a:xfrm>
-          <a:off x="0" y="284513"/>
+          <a:off x="0" y="986513"/>
           <a:ext cx="10653579" cy="1216800"/>
         </a:xfrm>
         <a:prstGeom prst="roundRect">
@@ -2560,25 +2498,25 @@
             <a:buNone/>
           </a:pPr>
           <a:r>
-            <a:rPr lang="pt-PT" sz="2800" kern="1200" dirty="0"/>
+            <a:rPr lang="pt-PT" sz="2800" kern="1200"/>
             <a:t>Criação de 3 utilizadores (trinta.org, 3emfrente.eu, the.com)</a:t>
           </a:r>
           <a:endParaRPr lang="en-US" sz="2800" kern="1200" dirty="0"/>
         </a:p>
       </dsp:txBody>
       <dsp:txXfrm>
-        <a:off x="59399" y="343912"/>
+        <a:off x="59399" y="1045912"/>
         <a:ext cx="10534781" cy="1098002"/>
       </dsp:txXfrm>
     </dsp:sp>
-    <dsp:sp modelId="{C13ABA29-EC0A-4897-99A3-1BA2E1C9DC72}">
+    <dsp:sp modelId="{84117C14-5A47-4CB2-8553-F4D0C3D2E9D3}">
       <dsp:nvSpPr>
         <dsp:cNvPr id="0" name=""/>
         <dsp:cNvSpPr/>
       </dsp:nvSpPr>
       <dsp:spPr>
         <a:xfrm>
-          <a:off x="0" y="1688514"/>
+          <a:off x="0" y="2390514"/>
           <a:ext cx="10653579" cy="1216800"/>
         </a:xfrm>
         <a:prstGeom prst="roundRect">
@@ -2639,101 +2577,14 @@
             <a:buNone/>
           </a:pPr>
           <a:r>
-            <a:rPr lang="pt-PT" sz="2800" kern="1200" dirty="0"/>
-            <a:t>Criação da diretoria ‘</a:t>
-          </a:r>
-          <a:r>
-            <a:rPr lang="pt-PT" sz="2800" kern="1200" dirty="0" err="1"/>
-            <a:t>public_html</a:t>
-          </a:r>
-          <a:r>
-            <a:rPr lang="pt-PT" sz="2800" kern="1200" dirty="0"/>
-            <a:t>’</a:t>
-          </a:r>
-          <a:endParaRPr lang="en-US" sz="2800" kern="1200" dirty="0"/>
-        </a:p>
-      </dsp:txBody>
-      <dsp:txXfrm>
-        <a:off x="59399" y="1747913"/>
-        <a:ext cx="10534781" cy="1098002"/>
-      </dsp:txXfrm>
-    </dsp:sp>
-    <dsp:sp modelId="{84117C14-5A47-4CB2-8553-F4D0C3D2E9D3}">
-      <dsp:nvSpPr>
-        <dsp:cNvPr id="0" name=""/>
-        <dsp:cNvSpPr/>
-      </dsp:nvSpPr>
-      <dsp:spPr>
-        <a:xfrm>
-          <a:off x="0" y="3092514"/>
-          <a:ext cx="10653579" cy="1216800"/>
-        </a:xfrm>
-        <a:prstGeom prst="roundRect">
-          <a:avLst/>
-        </a:prstGeom>
-        <a:solidFill>
-          <a:schemeClr val="accent1">
-            <a:hueOff val="0"/>
-            <a:satOff val="0"/>
-            <a:lumOff val="0"/>
-            <a:alphaOff val="0"/>
-          </a:schemeClr>
-        </a:solidFill>
-        <a:ln w="12700" cap="flat" cmpd="sng" algn="ctr">
-          <a:solidFill>
-            <a:schemeClr val="lt1">
-              <a:hueOff val="0"/>
-              <a:satOff val="0"/>
-              <a:lumOff val="0"/>
-              <a:alphaOff val="0"/>
-            </a:schemeClr>
-          </a:solidFill>
-          <a:prstDash val="solid"/>
-          <a:miter lim="800000"/>
-        </a:ln>
-        <a:effectLst/>
-      </dsp:spPr>
-      <dsp:style>
-        <a:lnRef idx="2">
-          <a:scrgbClr r="0" g="0" b="0"/>
-        </a:lnRef>
-        <a:fillRef idx="1">
-          <a:scrgbClr r="0" g="0" b="0"/>
-        </a:fillRef>
-        <a:effectRef idx="0">
-          <a:scrgbClr r="0" g="0" b="0"/>
-        </a:effectRef>
-        <a:fontRef idx="minor">
-          <a:schemeClr val="lt1"/>
-        </a:fontRef>
-      </dsp:style>
-      <dsp:txBody>
-        <a:bodyPr spcFirstLastPara="0" vert="horz" wrap="square" lIns="106680" tIns="106680" rIns="106680" bIns="106680" numCol="1" spcCol="1270" anchor="ctr" anchorCtr="0">
-          <a:noAutofit/>
-        </a:bodyPr>
-        <a:lstStyle/>
-        <a:p>
-          <a:pPr marL="0" lvl="0" indent="0" algn="l" defTabSz="1244600">
-            <a:lnSpc>
-              <a:spcPct val="90000"/>
-            </a:lnSpc>
-            <a:spcBef>
-              <a:spcPct val="0"/>
-            </a:spcBef>
-            <a:spcAft>
-              <a:spcPct val="35000"/>
-            </a:spcAft>
-            <a:buNone/>
-          </a:pPr>
-          <a:r>
-            <a:rPr lang="pt-PT" sz="2800" kern="1200" dirty="0"/>
+            <a:rPr lang="pt-PT" sz="2800" kern="1200"/>
             <a:t>Criação de ficheiro ‘index.html’</a:t>
           </a:r>
           <a:endParaRPr lang="en-US" sz="2800" kern="1200" dirty="0"/>
         </a:p>
       </dsp:txBody>
       <dsp:txXfrm>
-        <a:off x="59399" y="3151913"/>
+        <a:off x="59399" y="2449913"/>
         <a:ext cx="10534781" cy="1098002"/>
       </dsp:txXfrm>
     </dsp:sp>
@@ -5692,7 +5543,7 @@
           <a:p>
             <a:fld id="{C128FA71-3A18-48C0-980F-4B68F7F63042}" type="datetime1">
               <a:rPr lang="en-US" smtClean="0"/>
-              <a:t>6/1/2025</a:t>
+              <a:t>6/2/2025</a:t>
             </a:fld>
             <a:endParaRPr lang="en-US"/>
           </a:p>
@@ -5900,7 +5751,7 @@
           <a:p>
             <a:fld id="{7104EDB3-C0E8-45F8-9E1D-1B6C8D1880C0}" type="datetime1">
               <a:rPr lang="en-US" smtClean="0"/>
-              <a:t>6/1/2025</a:t>
+              <a:t>6/2/2025</a:t>
             </a:fld>
             <a:endParaRPr lang="en-US"/>
           </a:p>
@@ -6110,7 +5961,7 @@
           <a:p>
             <a:fld id="{9CF0EC4B-54ED-4041-B552-9BA760FA3DBA}" type="datetime1">
               <a:rPr lang="en-US" smtClean="0"/>
-              <a:t>6/1/2025</a:t>
+              <a:t>6/2/2025</a:t>
             </a:fld>
             <a:endParaRPr lang="en-US"/>
           </a:p>
@@ -6308,7 +6159,7 @@
           <a:p>
             <a:fld id="{51C1210E-201E-4473-82AC-2466F5386C38}" type="datetime1">
               <a:rPr lang="en-US" smtClean="0"/>
-              <a:t>6/1/2025</a:t>
+              <a:t>6/2/2025</a:t>
             </a:fld>
             <a:endParaRPr lang="en-US"/>
           </a:p>
@@ -6586,7 +6437,7 @@
           <a:p>
             <a:fld id="{B01EA198-6CAB-4B8F-B93F-1F9C8C4B6CE7}" type="datetime1">
               <a:rPr lang="en-US" smtClean="0"/>
-              <a:t>6/1/2025</a:t>
+              <a:t>6/2/2025</a:t>
             </a:fld>
             <a:endParaRPr lang="en-US"/>
           </a:p>
@@ -6858,7 +6709,7 @@
           <a:p>
             <a:fld id="{CA06041F-4525-44D5-AA4F-332294BF1F56}" type="datetime1">
               <a:rPr lang="en-US" smtClean="0"/>
-              <a:t>6/1/2025</a:t>
+              <a:t>6/2/2025</a:t>
             </a:fld>
             <a:endParaRPr lang="en-US"/>
           </a:p>
@@ -7282,7 +7133,7 @@
           <a:p>
             <a:fld id="{F9557091-BBDF-4EB9-BA6B-2BB67AC4FC0F}" type="datetime1">
               <a:rPr lang="en-US" smtClean="0"/>
-              <a:t>6/1/2025</a:t>
+              <a:t>6/2/2025</a:t>
             </a:fld>
             <a:endParaRPr lang="en-US"/>
           </a:p>
@@ -7423,7 +7274,7 @@
           <a:p>
             <a:fld id="{2D6B226B-77A6-410C-9796-083F278E0125}" type="datetime1">
               <a:rPr lang="en-US" smtClean="0"/>
-              <a:t>6/1/2025</a:t>
+              <a:t>6/2/2025</a:t>
             </a:fld>
             <a:endParaRPr lang="en-US"/>
           </a:p>
@@ -7536,7 +7387,7 @@
           <a:p>
             <a:fld id="{A23A578B-D289-4C40-8593-3D356C49DA58}" type="datetime1">
               <a:rPr lang="en-US" smtClean="0"/>
-              <a:t>6/1/2025</a:t>
+              <a:t>6/2/2025</a:t>
             </a:fld>
             <a:endParaRPr lang="en-US"/>
           </a:p>
@@ -7855,7 +7706,7 @@
           <a:p>
             <a:fld id="{713DFAE3-14DB-48A7-A80F-80DDB072CE3D}" type="datetime1">
               <a:rPr lang="en-US" smtClean="0"/>
-              <a:t>6/1/2025</a:t>
+              <a:t>6/2/2025</a:t>
             </a:fld>
             <a:endParaRPr lang="en-US"/>
           </a:p>
@@ -8149,7 +8000,7 @@
           <a:p>
             <a:fld id="{92C5EAEF-6478-4102-8F5D-A5FE9FC97ACB}" type="datetime1">
               <a:rPr lang="en-US" smtClean="0"/>
-              <a:t>6/1/2025</a:t>
+              <a:t>6/2/2025</a:t>
             </a:fld>
             <a:endParaRPr lang="en-US"/>
           </a:p>
@@ -8390,7 +8241,7 @@
           <a:p>
             <a:fld id="{67F45AC6-C491-4585-A584-9CE2AF7D5500}" type="datetime1">
               <a:rPr lang="en-US" smtClean="0"/>
-              <a:t>6/1/2025</a:t>
+              <a:t>6/2/2025</a:t>
             </a:fld>
             <a:endParaRPr lang="en-US"/>
           </a:p>
@@ -9202,10 +9053,10 @@
       </p:grpSpPr>
       <p:sp useBgFill="1">
         <p:nvSpPr>
-          <p:cNvPr id="15" name="Rectangle 14">
-            <a:extLst>
-              <a:ext uri="{FF2B5EF4-FFF2-40B4-BE49-F238E27FC236}">
-                <a16:creationId xmlns:a16="http://schemas.microsoft.com/office/drawing/2014/main" id="{37B65277-82C6-6D08-6DCA-4A7DCC3B7136}"/>
+          <p:cNvPr id="20" name="Rectangle 19">
+            <a:extLst>
+              <a:ext uri="{FF2B5EF4-FFF2-40B4-BE49-F238E27FC236}">
+                <a16:creationId xmlns:a16="http://schemas.microsoft.com/office/drawing/2014/main" id="{CBB0869A-0BE5-B3E9-F73D-2F3691E4D932}"/>
               </a:ext>
               <a:ext uri="{C183D7F6-B498-43B3-948B-1728B52AA6E4}">
                 <adec:decorative xmlns:adec="http://schemas.microsoft.com/office/drawing/2017/decorative" val="1"/>
@@ -9294,8 +9145,8 @@
         </p:nvSpPr>
         <p:spPr>
           <a:xfrm>
-            <a:off x="612647" y="603504"/>
-            <a:ext cx="6201107" cy="1527048"/>
+            <a:off x="612648" y="1114923"/>
+            <a:ext cx="4621553" cy="1360728"/>
           </a:xfrm>
         </p:spPr>
         <p:txBody>
@@ -9305,12 +9156,8 @@
           <a:lstStyle/>
           <a:p>
             <a:r>
-              <a:rPr lang="pt-PT" dirty="0"/>
-              <a:t>Configuração Virtual </a:t>
-            </a:r>
-            <a:r>
-              <a:rPr lang="pt-PT" dirty="0" err="1"/>
-              <a:t>Hosts</a:t>
+              <a:rPr lang="pt-PT"/>
+              <a:t>Configuração Virtual Hosts</a:t>
             </a:r>
             <a:endParaRPr lang="pt-PT" dirty="0"/>
           </a:p>
@@ -9334,8 +9181,8 @@
         </p:nvSpPr>
         <p:spPr>
           <a:xfrm>
-            <a:off x="612648" y="2212848"/>
-            <a:ext cx="5862396" cy="4096512"/>
+            <a:off x="612648" y="2584058"/>
+            <a:ext cx="4621553" cy="3159018"/>
           </a:xfrm>
         </p:spPr>
         <p:txBody>
@@ -9349,22 +9196,22 @@
               <a:t>Detalhes sobre a Virtual </a:t>
             </a:r>
             <a:r>
-              <a:rPr lang="pt-PT" sz="1800"/>
+              <a:rPr lang="pt-PT" sz="1800" dirty="0" err="1"/>
               <a:t>Host</a:t>
             </a:r>
             <a:r>
               <a:rPr lang="pt-PT" sz="1800" dirty="0"/>
-              <a:t> (para a porta 80 e 443)</a:t>
+              <a:t> (para a porta 80, resolução 443 é feita na WAF)</a:t>
             </a:r>
           </a:p>
         </p:txBody>
       </p:sp>
       <p:pic>
         <p:nvPicPr>
-          <p:cNvPr id="5" name="Picture 4" descr="A white screen with black text&#10;&#10;AI-generated content may be incorrect.">
-            <a:extLst>
-              <a:ext uri="{FF2B5EF4-FFF2-40B4-BE49-F238E27FC236}">
-                <a16:creationId xmlns:a16="http://schemas.microsoft.com/office/drawing/2014/main" id="{FF6B1E09-B7C3-1B21-7623-B2EF51E3F6ED}"/>
+          <p:cNvPr id="8" name="Picture 7" descr="A screen shot of a computer code&#10;&#10;AI-generated content may be incorrect.">
+            <a:extLst>
+              <a:ext uri="{FF2B5EF4-FFF2-40B4-BE49-F238E27FC236}">
+                <a16:creationId xmlns:a16="http://schemas.microsoft.com/office/drawing/2014/main" id="{E79ABEDB-EBDF-0ABF-DE10-5F7BF6356792}"/>
               </a:ext>
             </a:extLst>
           </p:cNvPr>
@@ -9387,8 +9234,8 @@
         </p:blipFill>
         <p:spPr>
           <a:xfrm>
-            <a:off x="7325282" y="433384"/>
-            <a:ext cx="4213732" cy="6019618"/>
+            <a:off x="6452275" y="1114923"/>
+            <a:ext cx="4315752" cy="4628153"/>
           </a:xfrm>
           <a:prstGeom prst="rect">
             <a:avLst/>
@@ -9463,7 +9310,7 @@
       </p:grpSpPr>
       <p:sp useBgFill="1">
         <p:nvSpPr>
-          <p:cNvPr id="12" name="Rectangle 11">
+          <p:cNvPr id="17" name="Rectangle 16">
             <a:extLst>
               <a:ext uri="{FF2B5EF4-FFF2-40B4-BE49-F238E27FC236}">
                 <a16:creationId xmlns:a16="http://schemas.microsoft.com/office/drawing/2014/main" id="{9B65F7F7-2FCE-8F01-53DE-15C39342BE99}"/>
@@ -9575,10 +9422,10 @@
       </p:sp>
       <p:pic>
         <p:nvPicPr>
-          <p:cNvPr id="5" name="Content Placeholder 4" descr="A black rectangular object with white text&#10;&#10;AI-generated content may be incorrect.">
-            <a:extLst>
-              <a:ext uri="{FF2B5EF4-FFF2-40B4-BE49-F238E27FC236}">
-                <a16:creationId xmlns:a16="http://schemas.microsoft.com/office/drawing/2014/main" id="{8AADF225-EB64-DCE0-18C9-B8A5BCF45A6F}"/>
+          <p:cNvPr id="7" name="Content Placeholder 6" descr="A screenshot of a computer&#10;&#10;AI-generated content may be incorrect.">
+            <a:extLst>
+              <a:ext uri="{FF2B5EF4-FFF2-40B4-BE49-F238E27FC236}">
+                <a16:creationId xmlns:a16="http://schemas.microsoft.com/office/drawing/2014/main" id="{3D531340-9B6D-239F-07B8-5DE261BEB726}"/>
               </a:ext>
             </a:extLst>
           </p:cNvPr>
@@ -9603,8 +9450,8 @@
         </p:blipFill>
         <p:spPr>
           <a:xfrm>
-            <a:off x="1994916" y="3012086"/>
-            <a:ext cx="8202168" cy="2112058"/>
+            <a:off x="1994916" y="2540462"/>
+            <a:ext cx="8202168" cy="3055306"/>
           </a:xfrm>
           <a:prstGeom prst="rect">
             <a:avLst/>
@@ -10470,10 +10317,10 @@
       </p:pic>
       <p:pic>
         <p:nvPicPr>
-          <p:cNvPr id="7" name="Picture 6" descr="A blue rectangular sign with white text&#10;&#10;AI-generated content may be incorrect.">
-            <a:extLst>
-              <a:ext uri="{FF2B5EF4-FFF2-40B4-BE49-F238E27FC236}">
-                <a16:creationId xmlns:a16="http://schemas.microsoft.com/office/drawing/2014/main" id="{2F4DAAD5-163F-AC2A-D5BA-015519A05829}"/>
+          <p:cNvPr id="13" name="Picture 12" descr="A screenshot of a computer&#10;&#10;AI-generated content may be incorrect.">
+            <a:extLst>
+              <a:ext uri="{FF2B5EF4-FFF2-40B4-BE49-F238E27FC236}">
+                <a16:creationId xmlns:a16="http://schemas.microsoft.com/office/drawing/2014/main" id="{1162E6A6-9769-FAA5-9D8D-61A78BB88F03}"/>
               </a:ext>
             </a:extLst>
           </p:cNvPr>
@@ -10484,42 +10331,6 @@
         </p:nvPicPr>
         <p:blipFill>
           <a:blip r:embed="rId3">
-            <a:extLst>
-              <a:ext uri="{28A0092B-C50C-407E-A947-70E740481C1C}">
-                <a14:useLocalDpi xmlns:a14="http://schemas.microsoft.com/office/drawing/2010/main" val="0"/>
-              </a:ext>
-            </a:extLst>
-          </a:blip>
-          <a:stretch>
-            <a:fillRect/>
-          </a:stretch>
-        </p:blipFill>
-        <p:spPr>
-          <a:xfrm>
-            <a:off x="6908654" y="1985272"/>
-            <a:ext cx="3154481" cy="962117"/>
-          </a:xfrm>
-          <a:prstGeom prst="rect">
-            <a:avLst/>
-          </a:prstGeom>
-        </p:spPr>
-      </p:pic>
-      <p:pic>
-        <p:nvPicPr>
-          <p:cNvPr id="13" name="Picture 12" descr="A screenshot of a computer&#10;&#10;AI-generated content may be incorrect.">
-            <a:extLst>
-              <a:ext uri="{FF2B5EF4-FFF2-40B4-BE49-F238E27FC236}">
-                <a16:creationId xmlns:a16="http://schemas.microsoft.com/office/drawing/2014/main" id="{1162E6A6-9769-FAA5-9D8D-61A78BB88F03}"/>
-              </a:ext>
-            </a:extLst>
-          </p:cNvPr>
-          <p:cNvPicPr>
-            <a:picLocks noChangeAspect="1"/>
-          </p:cNvPicPr>
-          <p:nvPr/>
-        </p:nvPicPr>
-        <p:blipFill>
-          <a:blip r:embed="rId4">
             <a:extLst>
               <a:ext uri="{28A0092B-C50C-407E-A947-70E740481C1C}">
                 <a14:useLocalDpi xmlns:a14="http://schemas.microsoft.com/office/drawing/2010/main" val="0"/>
@@ -10555,7 +10366,7 @@
           <p:nvPr/>
         </p:nvPicPr>
         <p:blipFill>
-          <a:blip r:embed="rId5">
+          <a:blip r:embed="rId4">
             <a:extLst>
               <a:ext uri="{28A0092B-C50C-407E-A947-70E740481C1C}">
                 <a14:useLocalDpi xmlns:a14="http://schemas.microsoft.com/office/drawing/2010/main" val="0"/>
@@ -10591,7 +10402,7 @@
           <p:nvPr/>
         </p:nvPicPr>
         <p:blipFill>
-          <a:blip r:embed="rId3">
+          <a:blip r:embed="rId5">
             <a:extLst>
               <a:ext uri="{28A0092B-C50C-407E-A947-70E740481C1C}">
                 <a14:useLocalDpi xmlns:a14="http://schemas.microsoft.com/office/drawing/2010/main" val="0"/>
@@ -10624,7 +10435,6 @@
           <p:cNvCxnSpPr>
             <a:cxnSpLocks/>
             <a:stCxn id="5" idx="3"/>
-            <a:endCxn id="7" idx="1"/>
           </p:cNvCxnSpPr>
           <p:nvPr/>
         </p:nvCxnSpPr>
@@ -10666,7 +10476,6 @@
           </p:cNvPr>
           <p:cNvCxnSpPr>
             <a:cxnSpLocks/>
-            <a:stCxn id="7" idx="2"/>
             <a:endCxn id="14" idx="0"/>
           </p:cNvCxnSpPr>
           <p:nvPr/>
@@ -10827,6 +10636,42 @@
           </a:fontRef>
         </p:style>
       </p:cxnSp>
+      <p:pic>
+        <p:nvPicPr>
+          <p:cNvPr id="6" name="Picture 5" descr="A blue background with white text&#10;&#10;AI-generated content may be incorrect.">
+            <a:extLst>
+              <a:ext uri="{FF2B5EF4-FFF2-40B4-BE49-F238E27FC236}">
+                <a16:creationId xmlns:a16="http://schemas.microsoft.com/office/drawing/2014/main" id="{6B096F42-11FE-6F9C-7702-8340C89E6CC6}"/>
+              </a:ext>
+            </a:extLst>
+          </p:cNvPr>
+          <p:cNvPicPr>
+            <a:picLocks noChangeAspect="1"/>
+          </p:cNvPicPr>
+          <p:nvPr/>
+        </p:nvPicPr>
+        <p:blipFill>
+          <a:blip r:embed="rId6">
+            <a:extLst>
+              <a:ext uri="{28A0092B-C50C-407E-A947-70E740481C1C}">
+                <a14:useLocalDpi xmlns:a14="http://schemas.microsoft.com/office/drawing/2010/main" val="0"/>
+              </a:ext>
+            </a:extLst>
+          </a:blip>
+          <a:stretch>
+            <a:fillRect/>
+          </a:stretch>
+        </p:blipFill>
+        <p:spPr>
+          <a:xfrm>
+            <a:off x="6937859" y="1985272"/>
+            <a:ext cx="3154480" cy="926150"/>
+          </a:xfrm>
+          <a:prstGeom prst="rect">
+            <a:avLst/>
+          </a:prstGeom>
+        </p:spPr>
+      </p:pic>
     </p:spTree>
     <p:extLst>
       <p:ext uri="{BB962C8B-B14F-4D97-AF65-F5344CB8AC3E}">
@@ -13285,8 +13130,12 @@
           <a:lstStyle/>
           <a:p>
             <a:r>
-              <a:rPr lang="pt-PT"/>
-              <a:t>Configuração Virtual Hosts</a:t>
+              <a:rPr lang="pt-PT" dirty="0"/>
+              <a:t>Configuração Virtual </a:t>
+            </a:r>
+            <a:r>
+              <a:rPr lang="pt-PT" dirty="0" err="1"/>
+              <a:t>Hosts</a:t>
             </a:r>
             <a:endParaRPr lang="pt-PT" dirty="0"/>
           </a:p>
@@ -13308,7 +13157,7 @@
             <p:ph idx="1"/>
             <p:extLst>
               <p:ext uri="{D42A27DB-BD31-4B8C-83A1-F6EECF244321}">
-                <p14:modId xmlns:p14="http://schemas.microsoft.com/office/powerpoint/2010/main" val="2569364999"/>
+                <p14:modId xmlns:p14="http://schemas.microsoft.com/office/powerpoint/2010/main" val="2942022059"/>
               </p:ext>
             </p:extLst>
           </p:nvPr>

</xml_diff>

<commit_message>
Testes com 'Kali' realizados, atualização basicamente final de relatório e powerpoint
</commit_message>
<xml_diff>
--- a/Presentation/SlidesApresentaçãoProjeto.pptx
+++ b/Presentation/SlidesApresentaçãoProjeto.pptx
@@ -20,8 +20,9 @@
     <p:sldId id="271" r:id="rId14"/>
     <p:sldId id="275" r:id="rId15"/>
     <p:sldId id="272" r:id="rId16"/>
-    <p:sldId id="273" r:id="rId17"/>
-    <p:sldId id="274" r:id="rId18"/>
+    <p:sldId id="276" r:id="rId17"/>
+    <p:sldId id="273" r:id="rId18"/>
+    <p:sldId id="274" r:id="rId19"/>
   </p:sldIdLst>
   <p:sldSz cx="12192000" cy="6858000"/>
   <p:notesSz cx="6858000" cy="9144000"/>
@@ -5543,7 +5544,7 @@
           <a:p>
             <a:fld id="{C128FA71-3A18-48C0-980F-4B68F7F63042}" type="datetime1">
               <a:rPr lang="en-US" smtClean="0"/>
-              <a:t>6/2/2025</a:t>
+              <a:t>6/3/2025</a:t>
             </a:fld>
             <a:endParaRPr lang="en-US"/>
           </a:p>
@@ -5751,7 +5752,7 @@
           <a:p>
             <a:fld id="{7104EDB3-C0E8-45F8-9E1D-1B6C8D1880C0}" type="datetime1">
               <a:rPr lang="en-US" smtClean="0"/>
-              <a:t>6/2/2025</a:t>
+              <a:t>6/3/2025</a:t>
             </a:fld>
             <a:endParaRPr lang="en-US"/>
           </a:p>
@@ -5961,7 +5962,7 @@
           <a:p>
             <a:fld id="{9CF0EC4B-54ED-4041-B552-9BA760FA3DBA}" type="datetime1">
               <a:rPr lang="en-US" smtClean="0"/>
-              <a:t>6/2/2025</a:t>
+              <a:t>6/3/2025</a:t>
             </a:fld>
             <a:endParaRPr lang="en-US"/>
           </a:p>
@@ -6159,7 +6160,7 @@
           <a:p>
             <a:fld id="{51C1210E-201E-4473-82AC-2466F5386C38}" type="datetime1">
               <a:rPr lang="en-US" smtClean="0"/>
-              <a:t>6/2/2025</a:t>
+              <a:t>6/3/2025</a:t>
             </a:fld>
             <a:endParaRPr lang="en-US"/>
           </a:p>
@@ -6437,7 +6438,7 @@
           <a:p>
             <a:fld id="{B01EA198-6CAB-4B8F-B93F-1F9C8C4B6CE7}" type="datetime1">
               <a:rPr lang="en-US" smtClean="0"/>
-              <a:t>6/2/2025</a:t>
+              <a:t>6/3/2025</a:t>
             </a:fld>
             <a:endParaRPr lang="en-US"/>
           </a:p>
@@ -6709,7 +6710,7 @@
           <a:p>
             <a:fld id="{CA06041F-4525-44D5-AA4F-332294BF1F56}" type="datetime1">
               <a:rPr lang="en-US" smtClean="0"/>
-              <a:t>6/2/2025</a:t>
+              <a:t>6/3/2025</a:t>
             </a:fld>
             <a:endParaRPr lang="en-US"/>
           </a:p>
@@ -7133,7 +7134,7 @@
           <a:p>
             <a:fld id="{F9557091-BBDF-4EB9-BA6B-2BB67AC4FC0F}" type="datetime1">
               <a:rPr lang="en-US" smtClean="0"/>
-              <a:t>6/2/2025</a:t>
+              <a:t>6/3/2025</a:t>
             </a:fld>
             <a:endParaRPr lang="en-US"/>
           </a:p>
@@ -7274,7 +7275,7 @@
           <a:p>
             <a:fld id="{2D6B226B-77A6-410C-9796-083F278E0125}" type="datetime1">
               <a:rPr lang="en-US" smtClean="0"/>
-              <a:t>6/2/2025</a:t>
+              <a:t>6/3/2025</a:t>
             </a:fld>
             <a:endParaRPr lang="en-US"/>
           </a:p>
@@ -7387,7 +7388,7 @@
           <a:p>
             <a:fld id="{A23A578B-D289-4C40-8593-3D356C49DA58}" type="datetime1">
               <a:rPr lang="en-US" smtClean="0"/>
-              <a:t>6/2/2025</a:t>
+              <a:t>6/3/2025</a:t>
             </a:fld>
             <a:endParaRPr lang="en-US"/>
           </a:p>
@@ -7706,7 +7707,7 @@
           <a:p>
             <a:fld id="{713DFAE3-14DB-48A7-A80F-80DDB072CE3D}" type="datetime1">
               <a:rPr lang="en-US" smtClean="0"/>
-              <a:t>6/2/2025</a:t>
+              <a:t>6/3/2025</a:t>
             </a:fld>
             <a:endParaRPr lang="en-US"/>
           </a:p>
@@ -8000,7 +8001,7 @@
           <a:p>
             <a:fld id="{92C5EAEF-6478-4102-8F5D-A5FE9FC97ACB}" type="datetime1">
               <a:rPr lang="en-US" smtClean="0"/>
-              <a:t>6/2/2025</a:t>
+              <a:t>6/3/2025</a:t>
             </a:fld>
             <a:endParaRPr lang="en-US"/>
           </a:p>
@@ -8241,7 +8242,7 @@
           <a:p>
             <a:fld id="{67F45AC6-C491-4585-A584-9CE2AF7D5500}" type="datetime1">
               <a:rPr lang="en-US" smtClean="0"/>
-              <a:t>6/2/2025</a:t>
+              <a:t>6/3/2025</a:t>
             </a:fld>
             <a:endParaRPr lang="en-US"/>
           </a:p>
@@ -10351,78 +10352,6 @@
           </a:prstGeom>
         </p:spPr>
       </p:pic>
-      <p:pic>
-        <p:nvPicPr>
-          <p:cNvPr id="11" name="Picture 10" descr="A screen shot of a computer program&#10;&#10;AI-generated content may be incorrect.">
-            <a:extLst>
-              <a:ext uri="{FF2B5EF4-FFF2-40B4-BE49-F238E27FC236}">
-                <a16:creationId xmlns:a16="http://schemas.microsoft.com/office/drawing/2014/main" id="{E02C0645-30DE-6C89-C535-B7EC03C73DF6}"/>
-              </a:ext>
-            </a:extLst>
-          </p:cNvPr>
-          <p:cNvPicPr>
-            <a:picLocks noChangeAspect="1"/>
-          </p:cNvPicPr>
-          <p:nvPr/>
-        </p:nvPicPr>
-        <p:blipFill>
-          <a:blip r:embed="rId4">
-            <a:extLst>
-              <a:ext uri="{28A0092B-C50C-407E-A947-70E740481C1C}">
-                <a14:useLocalDpi xmlns:a14="http://schemas.microsoft.com/office/drawing/2010/main" val="0"/>
-              </a:ext>
-            </a:extLst>
-          </a:blip>
-          <a:stretch>
-            <a:fillRect/>
-          </a:stretch>
-        </p:blipFill>
-        <p:spPr>
-          <a:xfrm>
-            <a:off x="6908654" y="4808271"/>
-            <a:ext cx="3154481" cy="1387971"/>
-          </a:xfrm>
-          <a:prstGeom prst="rect">
-            <a:avLst/>
-          </a:prstGeom>
-        </p:spPr>
-      </p:pic>
-      <p:pic>
-        <p:nvPicPr>
-          <p:cNvPr id="14" name="Picture 13" descr="A blue rectangular sign with white text&#10;&#10;AI-generated content may be incorrect.">
-            <a:extLst>
-              <a:ext uri="{FF2B5EF4-FFF2-40B4-BE49-F238E27FC236}">
-                <a16:creationId xmlns:a16="http://schemas.microsoft.com/office/drawing/2014/main" id="{A9E13D19-3C39-69BA-5447-D1B5D669316D}"/>
-              </a:ext>
-            </a:extLst>
-          </p:cNvPr>
-          <p:cNvPicPr>
-            <a:picLocks noChangeAspect="1"/>
-          </p:cNvPicPr>
-          <p:nvPr/>
-        </p:nvPicPr>
-        <p:blipFill>
-          <a:blip r:embed="rId5">
-            <a:extLst>
-              <a:ext uri="{28A0092B-C50C-407E-A947-70E740481C1C}">
-                <a14:useLocalDpi xmlns:a14="http://schemas.microsoft.com/office/drawing/2010/main" val="0"/>
-              </a:ext>
-            </a:extLst>
-          </a:blip>
-          <a:stretch>
-            <a:fillRect/>
-          </a:stretch>
-        </p:blipFill>
-        <p:spPr>
-          <a:xfrm>
-            <a:off x="6908654" y="3393360"/>
-            <a:ext cx="3154481" cy="962117"/>
-          </a:xfrm>
-          <a:prstGeom prst="rect">
-            <a:avLst/>
-          </a:prstGeom>
-        </p:spPr>
-      </p:pic>
       <p:cxnSp>
         <p:nvCxnSpPr>
           <p:cNvPr id="16" name="Straight Arrow Connector 15">
@@ -10476,14 +10405,15 @@
           </p:cNvPr>
           <p:cNvCxnSpPr>
             <a:cxnSpLocks/>
-            <a:endCxn id="14" idx="0"/>
+            <a:stCxn id="6" idx="2"/>
+            <a:endCxn id="15" idx="0"/>
           </p:cNvCxnSpPr>
           <p:nvPr/>
         </p:nvCxnSpPr>
         <p:spPr>
           <a:xfrm>
-            <a:off x="8485895" y="2947389"/>
-            <a:ext cx="0" cy="445971"/>
+            <a:off x="8515099" y="2911422"/>
+            <a:ext cx="1202" cy="535333"/>
           </a:xfrm>
           <a:prstGeom prst="straightConnector1">
             <a:avLst/>
@@ -10518,15 +10448,15 @@
           </p:cNvPr>
           <p:cNvCxnSpPr>
             <a:cxnSpLocks/>
-            <a:stCxn id="14" idx="2"/>
-            <a:endCxn id="11" idx="0"/>
+            <a:stCxn id="15" idx="2"/>
+            <a:endCxn id="7" idx="0"/>
           </p:cNvCxnSpPr>
           <p:nvPr/>
         </p:nvCxnSpPr>
         <p:spPr>
-          <a:xfrm>
-            <a:off x="8485895" y="4355477"/>
-            <a:ext cx="0" cy="452794"/>
+          <a:xfrm flipH="1">
+            <a:off x="8516300" y="4421647"/>
+            <a:ext cx="1" cy="601009"/>
           </a:xfrm>
           <a:prstGeom prst="straightConnector1">
             <a:avLst/>
@@ -10561,15 +10491,15 @@
           </p:cNvPr>
           <p:cNvCxnSpPr>
             <a:cxnSpLocks/>
-            <a:stCxn id="11" idx="1"/>
+            <a:stCxn id="7" idx="1"/>
             <a:endCxn id="13" idx="3"/>
           </p:cNvCxnSpPr>
           <p:nvPr/>
         </p:nvCxnSpPr>
         <p:spPr>
-          <a:xfrm flipH="1" flipV="1">
+          <a:xfrm flipH="1">
             <a:off x="5094422" y="5498845"/>
-            <a:ext cx="1814232" cy="3412"/>
+            <a:ext cx="1845839" cy="0"/>
           </a:xfrm>
           <a:prstGeom prst="straightConnector1">
             <a:avLst/>
@@ -10651,7 +10581,7 @@
           <p:nvPr/>
         </p:nvPicPr>
         <p:blipFill>
-          <a:blip r:embed="rId6">
+          <a:blip r:embed="rId4">
             <a:extLst>
               <a:ext uri="{28A0092B-C50C-407E-A947-70E740481C1C}">
                 <a14:useLocalDpi xmlns:a14="http://schemas.microsoft.com/office/drawing/2010/main" val="0"/>
@@ -10666,6 +10596,78 @@
           <a:xfrm>
             <a:off x="6937859" y="1985272"/>
             <a:ext cx="3154480" cy="926150"/>
+          </a:xfrm>
+          <a:prstGeom prst="rect">
+            <a:avLst/>
+          </a:prstGeom>
+        </p:spPr>
+      </p:pic>
+      <p:pic>
+        <p:nvPicPr>
+          <p:cNvPr id="7" name="Picture 6" descr="A blue rectangular object with white lines&#10;&#10;AI-generated content may be incorrect.">
+            <a:extLst>
+              <a:ext uri="{FF2B5EF4-FFF2-40B4-BE49-F238E27FC236}">
+                <a16:creationId xmlns:a16="http://schemas.microsoft.com/office/drawing/2014/main" id="{7211B908-541D-96B0-BE44-12F90C564B54}"/>
+              </a:ext>
+            </a:extLst>
+          </p:cNvPr>
+          <p:cNvPicPr>
+            <a:picLocks noChangeAspect="1"/>
+          </p:cNvPicPr>
+          <p:nvPr/>
+        </p:nvPicPr>
+        <p:blipFill>
+          <a:blip r:embed="rId5">
+            <a:extLst>
+              <a:ext uri="{28A0092B-C50C-407E-A947-70E740481C1C}">
+                <a14:useLocalDpi xmlns:a14="http://schemas.microsoft.com/office/drawing/2010/main" val="0"/>
+              </a:ext>
+            </a:extLst>
+          </a:blip>
+          <a:stretch>
+            <a:fillRect/>
+          </a:stretch>
+        </p:blipFill>
+        <p:spPr>
+          <a:xfrm>
+            <a:off x="6940261" y="5022656"/>
+            <a:ext cx="3152078" cy="952378"/>
+          </a:xfrm>
+          <a:prstGeom prst="rect">
+            <a:avLst/>
+          </a:prstGeom>
+        </p:spPr>
+      </p:pic>
+      <p:pic>
+        <p:nvPicPr>
+          <p:cNvPr id="15" name="Picture 14" descr="A blue rectangular object with white text&#10;&#10;AI-generated content may be incorrect.">
+            <a:extLst>
+              <a:ext uri="{FF2B5EF4-FFF2-40B4-BE49-F238E27FC236}">
+                <a16:creationId xmlns:a16="http://schemas.microsoft.com/office/drawing/2014/main" id="{23612D34-46A0-1B9B-176E-75099226FFD8}"/>
+              </a:ext>
+            </a:extLst>
+          </p:cNvPr>
+          <p:cNvPicPr>
+            <a:picLocks noChangeAspect="1"/>
+          </p:cNvPicPr>
+          <p:nvPr/>
+        </p:nvPicPr>
+        <p:blipFill>
+          <a:blip r:embed="rId6">
+            <a:extLst>
+              <a:ext uri="{28A0092B-C50C-407E-A947-70E740481C1C}">
+                <a14:useLocalDpi xmlns:a14="http://schemas.microsoft.com/office/drawing/2010/main" val="0"/>
+              </a:ext>
+            </a:extLst>
+          </a:blip>
+          <a:stretch>
+            <a:fillRect/>
+          </a:stretch>
+        </p:blipFill>
+        <p:spPr>
+          <a:xfrm>
+            <a:off x="6940262" y="3446755"/>
+            <a:ext cx="3152077" cy="974892"/>
           </a:xfrm>
           <a:prstGeom prst="rect">
             <a:avLst/>
@@ -10688,6 +10690,14 @@
 <file path=ppt/slides/slide15.xml><?xml version="1.0" encoding="utf-8"?>
 <p:sld xmlns:a="http://schemas.openxmlformats.org/drawingml/2006/main" xmlns:r="http://schemas.openxmlformats.org/officeDocument/2006/relationships" xmlns:p="http://schemas.openxmlformats.org/presentationml/2006/main">
   <p:cSld>
+    <p:bg>
+      <p:bgPr>
+        <a:solidFill>
+          <a:schemeClr val="bg1"/>
+        </a:solidFill>
+        <a:effectLst/>
+      </p:bgPr>
+    </p:bg>
     <p:spTree>
       <p:nvGrpSpPr>
         <p:cNvPr id="1" name="">
@@ -10710,6 +10720,85 @@
       </p:grpSpPr>
       <p:sp>
         <p:nvSpPr>
+          <p:cNvPr id="19" name="Rectangle 18">
+            <a:extLst>
+              <a:ext uri="{FF2B5EF4-FFF2-40B4-BE49-F238E27FC236}">
+                <a16:creationId xmlns:a16="http://schemas.microsoft.com/office/drawing/2014/main" id="{38ECB335-5FC8-6420-CF56-EDEFA115C672}"/>
+              </a:ext>
+              <a:ext uri="{C183D7F6-B498-43B3-948B-1728B52AA6E4}">
+                <adec:decorative xmlns:adec="http://schemas.microsoft.com/office/drawing/2017/decorative" val="1"/>
+              </a:ext>
+            </a:extLst>
+          </p:cNvPr>
+          <p:cNvSpPr>
+            <a:spLocks noGrp="1" noRot="1" noChangeAspect="1" noMove="1" noResize="1" noEditPoints="1" noAdjustHandles="1" noChangeArrowheads="1" noChangeShapeType="1" noTextEdit="1"/>
+          </p:cNvSpPr>
+          <p:nvPr>
+            <p:extLst>
+              <p:ext uri="{386F3935-93C4-4BCD-93E2-E3B085C9AB24}">
+                <p16:designElem xmlns:p16="http://schemas.microsoft.com/office/powerpoint/2015/main" val="1"/>
+              </p:ext>
+            </p:extLst>
+          </p:nvPr>
+        </p:nvSpPr>
+        <p:spPr>
+          <a:xfrm>
+            <a:off x="0" y="0"/>
+            <a:ext cx="12192000" cy="6858000"/>
+          </a:xfrm>
+          <a:prstGeom prst="rect">
+            <a:avLst/>
+          </a:prstGeom>
+          <a:solidFill>
+            <a:schemeClr val="bg1"/>
+          </a:solidFill>
+          <a:ln w="12700" cap="flat" cmpd="sng" algn="ctr">
+            <a:noFill/>
+            <a:prstDash val="solid"/>
+            <a:miter lim="800000"/>
+          </a:ln>
+          <a:effectLst/>
+          <a:extLst>
+            <a:ext uri="{91240B29-F687-4F45-9708-019B960494DF}">
+              <a14:hiddenLine xmlns:a14="http://schemas.microsoft.com/office/drawing/2010/main" w="12700" cap="flat" cmpd="sng" algn="ctr">
+                <a:solidFill>
+                  <a:schemeClr val="accent1">
+                    <a:shade val="15000"/>
+                  </a:schemeClr>
+                </a:solidFill>
+                <a:prstDash val="solid"/>
+                <a:miter lim="800000"/>
+              </a14:hiddenLine>
+            </a:ext>
+          </a:extLst>
+        </p:spPr>
+        <p:style>
+          <a:lnRef idx="2">
+            <a:schemeClr val="accent1">
+              <a:shade val="15000"/>
+            </a:schemeClr>
+          </a:lnRef>
+          <a:fillRef idx="1">
+            <a:schemeClr val="accent1"/>
+          </a:fillRef>
+          <a:effectRef idx="0">
+            <a:schemeClr val="accent1"/>
+          </a:effectRef>
+          <a:fontRef idx="minor">
+            <a:schemeClr val="lt1"/>
+          </a:fontRef>
+        </p:style>
+        <p:txBody>
+          <a:bodyPr rtlCol="0" anchor="ctr"/>
+          <a:lstStyle/>
+          <a:p>
+            <a:pPr algn="ctr"/>
+            <a:endParaRPr lang="en-US"/>
+          </a:p>
+        </p:txBody>
+      </p:sp>
+      <p:sp>
+        <p:nvSpPr>
           <p:cNvPr id="2" name="Title 1">
             <a:extLst>
               <a:ext uri="{FF2B5EF4-FFF2-40B4-BE49-F238E27FC236}">
@@ -10724,47 +10813,305 @@
             <p:ph type="title"/>
           </p:nvPr>
         </p:nvSpPr>
-        <p:spPr/>
+        <p:spPr>
+          <a:xfrm>
+            <a:off x="444361" y="643467"/>
+            <a:ext cx="11402404" cy="1363133"/>
+          </a:xfrm>
+        </p:spPr>
         <p:txBody>
-          <a:bodyPr/>
+          <a:bodyPr vert="horz" lIns="91440" tIns="45720" rIns="91440" bIns="45720" rtlCol="0" anchor="b">
+            <a:normAutofit/>
+          </a:bodyPr>
           <a:lstStyle/>
           <a:p>
+            <a:pPr algn="ctr"/>
+            <a:r>
+              <a:rPr lang="en-US" sz="4300" dirty="0" err="1"/>
+              <a:t>Resultado</a:t>
+            </a:r>
+            <a:r>
+              <a:rPr lang="en-US" sz="4300" dirty="0"/>
+              <a:t> WAF </a:t>
+            </a:r>
+            <a:br>
+              <a:rPr lang="en-US" sz="4300" dirty="0"/>
+            </a:br>
+            <a:r>
+              <a:rPr lang="en-US" sz="4300" dirty="0"/>
+              <a:t>(Testes com Kali Linux)</a:t>
+            </a:r>
+          </a:p>
+        </p:txBody>
+      </p:sp>
+      <p:pic>
+        <p:nvPicPr>
+          <p:cNvPr id="7" name="Picture 6" descr="A screenshot of a computer&#10;&#10;AI-generated content may be incorrect.">
+            <a:extLst>
+              <a:ext uri="{FF2B5EF4-FFF2-40B4-BE49-F238E27FC236}">
+                <a16:creationId xmlns:a16="http://schemas.microsoft.com/office/drawing/2014/main" id="{C8240CEB-80C9-F73D-CB8A-1515B6B26308}"/>
+              </a:ext>
+            </a:extLst>
+          </p:cNvPr>
+          <p:cNvPicPr>
+            <a:picLocks noChangeAspect="1"/>
+          </p:cNvPicPr>
+          <p:nvPr/>
+        </p:nvPicPr>
+        <p:blipFill>
+          <a:blip r:embed="rId2">
+            <a:extLst>
+              <a:ext uri="{28A0092B-C50C-407E-A947-70E740481C1C}">
+                <a14:useLocalDpi xmlns:a14="http://schemas.microsoft.com/office/drawing/2010/main" val="0"/>
+              </a:ext>
+            </a:extLst>
+          </a:blip>
+          <a:stretch>
+            <a:fillRect/>
+          </a:stretch>
+        </p:blipFill>
+        <p:spPr>
+          <a:xfrm>
+            <a:off x="4321335" y="2557906"/>
+            <a:ext cx="3648456" cy="2636009"/>
+          </a:xfrm>
+          <a:prstGeom prst="rect">
+            <a:avLst/>
+          </a:prstGeom>
+        </p:spPr>
+      </p:pic>
+      <p:pic>
+        <p:nvPicPr>
+          <p:cNvPr id="9" name="Picture 8" descr="A screenshot of a computer&#10;&#10;AI-generated content may be incorrect.">
+            <a:extLst>
+              <a:ext uri="{FF2B5EF4-FFF2-40B4-BE49-F238E27FC236}">
+                <a16:creationId xmlns:a16="http://schemas.microsoft.com/office/drawing/2014/main" id="{10958812-BA9B-F101-EADB-2A79A939C41D}"/>
+              </a:ext>
+            </a:extLst>
+          </p:cNvPr>
+          <p:cNvPicPr>
+            <a:picLocks noChangeAspect="1"/>
+          </p:cNvPicPr>
+          <p:nvPr/>
+        </p:nvPicPr>
+        <p:blipFill>
+          <a:blip r:embed="rId3">
+            <a:extLst>
+              <a:ext uri="{28A0092B-C50C-407E-A947-70E740481C1C}">
+                <a14:useLocalDpi xmlns:a14="http://schemas.microsoft.com/office/drawing/2010/main" val="0"/>
+              </a:ext>
+            </a:extLst>
+          </a:blip>
+          <a:stretch>
+            <a:fillRect/>
+          </a:stretch>
+        </p:blipFill>
+        <p:spPr>
+          <a:xfrm>
+            <a:off x="8198309" y="3009402"/>
+            <a:ext cx="3648456" cy="1733016"/>
+          </a:xfrm>
+          <a:prstGeom prst="rect">
+            <a:avLst/>
+          </a:prstGeom>
+        </p:spPr>
+      </p:pic>
+      <p:pic>
+        <p:nvPicPr>
+          <p:cNvPr id="5" name="Content Placeholder 4" descr="A screenshot of a computer&#10;&#10;AI-generated content may be incorrect.">
+            <a:extLst>
+              <a:ext uri="{FF2B5EF4-FFF2-40B4-BE49-F238E27FC236}">
+                <a16:creationId xmlns:a16="http://schemas.microsoft.com/office/drawing/2014/main" id="{677138F3-0575-2B62-C7CB-3D5DEE26F576}"/>
+              </a:ext>
+            </a:extLst>
+          </p:cNvPr>
+          <p:cNvPicPr>
+            <a:picLocks noGrp="1" noChangeAspect="1"/>
+          </p:cNvPicPr>
+          <p:nvPr>
+            <p:ph idx="1"/>
+          </p:nvPr>
+        </p:nvPicPr>
+        <p:blipFill>
+          <a:blip r:embed="rId4">
+            <a:extLst>
+              <a:ext uri="{28A0092B-C50C-407E-A947-70E740481C1C}">
+                <a14:useLocalDpi xmlns:a14="http://schemas.microsoft.com/office/drawing/2010/main" val="0"/>
+              </a:ext>
+            </a:extLst>
+          </a:blip>
+          <a:stretch>
+            <a:fillRect/>
+          </a:stretch>
+        </p:blipFill>
+        <p:spPr>
+          <a:xfrm>
+            <a:off x="444361" y="3319520"/>
+            <a:ext cx="3648456" cy="1112779"/>
+          </a:xfrm>
+          <a:prstGeom prst="rect">
+            <a:avLst/>
+          </a:prstGeom>
+        </p:spPr>
+      </p:pic>
+      <p:sp>
+        <p:nvSpPr>
+          <p:cNvPr id="10" name="TextBox 9">
+            <a:extLst>
+              <a:ext uri="{FF2B5EF4-FFF2-40B4-BE49-F238E27FC236}">
+                <a16:creationId xmlns:a16="http://schemas.microsoft.com/office/drawing/2014/main" id="{52FD557E-738E-6C47-484F-4272583E88BE}"/>
+              </a:ext>
+            </a:extLst>
+          </p:cNvPr>
+          <p:cNvSpPr txBox="1"/>
+          <p:nvPr/>
+        </p:nvSpPr>
+        <p:spPr>
+          <a:xfrm>
+            <a:off x="1347503" y="4660490"/>
+            <a:ext cx="1842171" cy="369332"/>
+          </a:xfrm>
+          <a:prstGeom prst="rect">
+            <a:avLst/>
+          </a:prstGeom>
+        </p:spPr>
+        <p:style>
+          <a:lnRef idx="2">
+            <a:schemeClr val="accent1"/>
+          </a:lnRef>
+          <a:fillRef idx="1">
+            <a:schemeClr val="lt1"/>
+          </a:fillRef>
+          <a:effectRef idx="0">
+            <a:schemeClr val="accent1"/>
+          </a:effectRef>
+          <a:fontRef idx="minor">
+            <a:schemeClr val="dk1"/>
+          </a:fontRef>
+        </p:style>
+        <p:txBody>
+          <a:bodyPr wrap="none" rtlCol="0">
+            <a:spAutoFit/>
+          </a:bodyPr>
+          <a:lstStyle/>
+          <a:p>
             <a:r>
               <a:rPr lang="pt-PT" dirty="0"/>
-              <a:t>Resultado WAF </a:t>
-            </a:r>
-            <a:br>
-              <a:rPr lang="pt-PT" dirty="0"/>
-            </a:br>
-            <a:r>
-              <a:rPr lang="pt-PT" dirty="0"/>
-              <a:t>(Testes com Kali Linux)</a:t>
+              <a:t>Sem Proteções</a:t>
             </a:r>
           </a:p>
         </p:txBody>
       </p:sp>
       <p:sp>
         <p:nvSpPr>
-          <p:cNvPr id="3" name="Content Placeholder 2">
-            <a:extLst>
-              <a:ext uri="{FF2B5EF4-FFF2-40B4-BE49-F238E27FC236}">
-                <a16:creationId xmlns:a16="http://schemas.microsoft.com/office/drawing/2014/main" id="{F2039C19-756A-464E-EE23-76F1595EACD2}"/>
-              </a:ext>
-            </a:extLst>
-          </p:cNvPr>
-          <p:cNvSpPr>
-            <a:spLocks noGrp="1"/>
-          </p:cNvSpPr>
-          <p:nvPr>
-            <p:ph idx="1"/>
-          </p:nvPr>
+          <p:cNvPr id="11" name="TextBox 10">
+            <a:extLst>
+              <a:ext uri="{FF2B5EF4-FFF2-40B4-BE49-F238E27FC236}">
+                <a16:creationId xmlns:a16="http://schemas.microsoft.com/office/drawing/2014/main" id="{2F6A11AE-3DE7-F1ED-6199-F9C8969CE983}"/>
+              </a:ext>
+            </a:extLst>
+          </p:cNvPr>
+          <p:cNvSpPr txBox="1"/>
+          <p:nvPr/>
         </p:nvSpPr>
-        <p:spPr/>
+        <p:spPr>
+          <a:xfrm>
+            <a:off x="4352444" y="5471959"/>
+            <a:ext cx="3586238" cy="369332"/>
+          </a:xfrm>
+          <a:prstGeom prst="rect">
+            <a:avLst/>
+          </a:prstGeom>
+        </p:spPr>
+        <p:style>
+          <a:lnRef idx="2">
+            <a:schemeClr val="accent1"/>
+          </a:lnRef>
+          <a:fillRef idx="1">
+            <a:schemeClr val="lt1"/>
+          </a:fillRef>
+          <a:effectRef idx="0">
+            <a:schemeClr val="accent1"/>
+          </a:effectRef>
+          <a:fontRef idx="minor">
+            <a:schemeClr val="dk1"/>
+          </a:fontRef>
+        </p:style>
         <p:txBody>
-          <a:bodyPr/>
+          <a:bodyPr wrap="none" rtlCol="0">
+            <a:spAutoFit/>
+          </a:bodyPr>
           <a:lstStyle/>
           <a:p>
-            <a:endParaRPr lang="pt-PT"/>
+            <a:r>
+              <a:rPr lang="pt-PT" dirty="0"/>
+              <a:t>IP </a:t>
+            </a:r>
+            <a:r>
+              <a:rPr lang="pt-PT" dirty="0" err="1"/>
+              <a:t>BlackList</a:t>
+            </a:r>
+            <a:r>
+              <a:rPr lang="pt-PT" dirty="0"/>
+              <a:t>/</a:t>
+            </a:r>
+            <a:r>
+              <a:rPr lang="pt-PT" dirty="0" err="1"/>
+              <a:t>Paises</a:t>
+            </a:r>
+            <a:r>
+              <a:rPr lang="pt-PT" dirty="0"/>
+              <a:t> Bloqueados</a:t>
+            </a:r>
+          </a:p>
+        </p:txBody>
+      </p:sp>
+      <p:sp>
+        <p:nvSpPr>
+          <p:cNvPr id="12" name="TextBox 11">
+            <a:extLst>
+              <a:ext uri="{FF2B5EF4-FFF2-40B4-BE49-F238E27FC236}">
+                <a16:creationId xmlns:a16="http://schemas.microsoft.com/office/drawing/2014/main" id="{9BAA9D3C-2123-97C0-B500-C60AD4261230}"/>
+              </a:ext>
+            </a:extLst>
+          </p:cNvPr>
+          <p:cNvSpPr txBox="1"/>
+          <p:nvPr/>
+        </p:nvSpPr>
+        <p:spPr>
+          <a:xfrm>
+            <a:off x="9472546" y="5009249"/>
+            <a:ext cx="1099981" cy="369332"/>
+          </a:xfrm>
+          <a:prstGeom prst="rect">
+            <a:avLst/>
+          </a:prstGeom>
+        </p:spPr>
+        <p:style>
+          <a:lnRef idx="2">
+            <a:schemeClr val="accent1"/>
+          </a:lnRef>
+          <a:fillRef idx="1">
+            <a:schemeClr val="lt1"/>
+          </a:fillRef>
+          <a:effectRef idx="0">
+            <a:schemeClr val="accent1"/>
+          </a:effectRef>
+          <a:fontRef idx="minor">
+            <a:schemeClr val="dk1"/>
+          </a:fontRef>
+        </p:style>
+        <p:txBody>
+          <a:bodyPr wrap="none" rtlCol="0">
+            <a:spAutoFit/>
+          </a:bodyPr>
+          <a:lstStyle/>
+          <a:p>
+            <a:r>
+              <a:rPr lang="pt-PT" dirty="0" err="1"/>
+              <a:t>Captcha</a:t>
+            </a:r>
+            <a:endParaRPr lang="pt-PT" dirty="0"/>
           </a:p>
         </p:txBody>
       </p:sp>
@@ -10794,6 +11141,436 @@
 </file>
 
 <file path=ppt/slides/slide16.xml><?xml version="1.0" encoding="utf-8"?>
+<p:sld xmlns:a="http://schemas.openxmlformats.org/drawingml/2006/main" xmlns:r="http://schemas.openxmlformats.org/officeDocument/2006/relationships" xmlns:p="http://schemas.openxmlformats.org/presentationml/2006/main">
+  <p:cSld>
+    <p:bg>
+      <p:bgPr>
+        <a:solidFill>
+          <a:schemeClr val="bg1"/>
+        </a:solidFill>
+        <a:effectLst/>
+      </p:bgPr>
+    </p:bg>
+    <p:spTree>
+      <p:nvGrpSpPr>
+        <p:cNvPr id="1" name=""/>
+        <p:cNvGrpSpPr/>
+        <p:nvPr/>
+      </p:nvGrpSpPr>
+      <p:grpSpPr>
+        <a:xfrm>
+          <a:off x="0" y="0"/>
+          <a:ext cx="0" cy="0"/>
+          <a:chOff x="0" y="0"/>
+          <a:chExt cx="0" cy="0"/>
+        </a:xfrm>
+      </p:grpSpPr>
+      <p:sp>
+        <p:nvSpPr>
+          <p:cNvPr id="16" name="Rectangle 15">
+            <a:extLst>
+              <a:ext uri="{FF2B5EF4-FFF2-40B4-BE49-F238E27FC236}">
+                <a16:creationId xmlns:a16="http://schemas.microsoft.com/office/drawing/2014/main" id="{8CAE37EF-F4E3-85EC-A603-860B29931FFF}"/>
+              </a:ext>
+              <a:ext uri="{C183D7F6-B498-43B3-948B-1728B52AA6E4}">
+                <adec:decorative xmlns:adec="http://schemas.microsoft.com/office/drawing/2017/decorative" val="1"/>
+              </a:ext>
+            </a:extLst>
+          </p:cNvPr>
+          <p:cNvSpPr>
+            <a:spLocks noGrp="1" noRot="1" noChangeAspect="1" noMove="1" noResize="1" noEditPoints="1" noAdjustHandles="1" noChangeArrowheads="1" noChangeShapeType="1" noTextEdit="1"/>
+          </p:cNvSpPr>
+          <p:nvPr>
+            <p:extLst>
+              <p:ext uri="{386F3935-93C4-4BCD-93E2-E3B085C9AB24}">
+                <p16:designElem xmlns:p16="http://schemas.microsoft.com/office/powerpoint/2015/main" val="1"/>
+              </p:ext>
+            </p:extLst>
+          </p:nvPr>
+        </p:nvSpPr>
+        <p:spPr>
+          <a:xfrm>
+            <a:off x="0" y="0"/>
+            <a:ext cx="12192000" cy="6858000"/>
+          </a:xfrm>
+          <a:prstGeom prst="rect">
+            <a:avLst/>
+          </a:prstGeom>
+          <a:solidFill>
+            <a:schemeClr val="bg1"/>
+          </a:solidFill>
+          <a:ln w="12700" cap="flat" cmpd="sng" algn="ctr">
+            <a:noFill/>
+            <a:prstDash val="solid"/>
+            <a:miter lim="800000"/>
+          </a:ln>
+          <a:effectLst/>
+          <a:extLst>
+            <a:ext uri="{91240B29-F687-4F45-9708-019B960494DF}">
+              <a14:hiddenLine xmlns:a14="http://schemas.microsoft.com/office/drawing/2010/main" w="12700" cap="flat" cmpd="sng" algn="ctr">
+                <a:solidFill>
+                  <a:schemeClr val="accent1">
+                    <a:shade val="15000"/>
+                  </a:schemeClr>
+                </a:solidFill>
+                <a:prstDash val="solid"/>
+                <a:miter lim="800000"/>
+              </a14:hiddenLine>
+            </a:ext>
+          </a:extLst>
+        </p:spPr>
+        <p:style>
+          <a:lnRef idx="2">
+            <a:schemeClr val="accent1">
+              <a:shade val="15000"/>
+            </a:schemeClr>
+          </a:lnRef>
+          <a:fillRef idx="1">
+            <a:schemeClr val="accent1"/>
+          </a:fillRef>
+          <a:effectRef idx="0">
+            <a:schemeClr val="accent1"/>
+          </a:effectRef>
+          <a:fontRef idx="minor">
+            <a:schemeClr val="lt1"/>
+          </a:fontRef>
+        </p:style>
+        <p:txBody>
+          <a:bodyPr rtlCol="0" anchor="ctr"/>
+          <a:lstStyle/>
+          <a:p>
+            <a:pPr algn="ctr"/>
+            <a:endParaRPr lang="en-US"/>
+          </a:p>
+        </p:txBody>
+      </p:sp>
+      <p:pic>
+        <p:nvPicPr>
+          <p:cNvPr id="7" name="Picture 6" descr="A screenshot of a computer program&#10;&#10;AI-generated content may be incorrect.">
+            <a:extLst>
+              <a:ext uri="{FF2B5EF4-FFF2-40B4-BE49-F238E27FC236}">
+                <a16:creationId xmlns:a16="http://schemas.microsoft.com/office/drawing/2014/main" id="{83CD483E-322C-3FFB-C860-E6F506E01079}"/>
+              </a:ext>
+            </a:extLst>
+          </p:cNvPr>
+          <p:cNvPicPr>
+            <a:picLocks noChangeAspect="1"/>
+          </p:cNvPicPr>
+          <p:nvPr/>
+        </p:nvPicPr>
+        <p:blipFill>
+          <a:blip r:embed="rId2">
+            <a:extLst>
+              <a:ext uri="{28A0092B-C50C-407E-A947-70E740481C1C}">
+                <a14:useLocalDpi xmlns:a14="http://schemas.microsoft.com/office/drawing/2010/main" val="0"/>
+              </a:ext>
+            </a:extLst>
+          </a:blip>
+          <a:stretch>
+            <a:fillRect/>
+          </a:stretch>
+        </p:blipFill>
+        <p:spPr>
+          <a:xfrm>
+            <a:off x="150660" y="4464434"/>
+            <a:ext cx="5841442" cy="1358133"/>
+          </a:xfrm>
+          <a:prstGeom prst="rect">
+            <a:avLst/>
+          </a:prstGeom>
+        </p:spPr>
+      </p:pic>
+      <p:pic>
+        <p:nvPicPr>
+          <p:cNvPr id="5" name="Content Placeholder 4" descr="A black screen with white text&#10;&#10;AI-generated content may be incorrect.">
+            <a:extLst>
+              <a:ext uri="{FF2B5EF4-FFF2-40B4-BE49-F238E27FC236}">
+                <a16:creationId xmlns:a16="http://schemas.microsoft.com/office/drawing/2014/main" id="{966A7010-55C3-4CEC-9360-152EF75B97A9}"/>
+              </a:ext>
+            </a:extLst>
+          </p:cNvPr>
+          <p:cNvPicPr>
+            <a:picLocks noGrp="1" noChangeAspect="1"/>
+          </p:cNvPicPr>
+          <p:nvPr>
+            <p:ph idx="1"/>
+          </p:nvPr>
+        </p:nvPicPr>
+        <p:blipFill>
+          <a:blip r:embed="rId3">
+            <a:extLst>
+              <a:ext uri="{28A0092B-C50C-407E-A947-70E740481C1C}">
+                <a14:useLocalDpi xmlns:a14="http://schemas.microsoft.com/office/drawing/2010/main" val="0"/>
+              </a:ext>
+            </a:extLst>
+          </a:blip>
+          <a:stretch>
+            <a:fillRect/>
+          </a:stretch>
+        </p:blipFill>
+        <p:spPr>
+          <a:xfrm>
+            <a:off x="2878727" y="1820365"/>
+            <a:ext cx="6434545" cy="1608635"/>
+          </a:xfrm>
+          <a:prstGeom prst="rect">
+            <a:avLst/>
+          </a:prstGeom>
+        </p:spPr>
+      </p:pic>
+      <p:pic>
+        <p:nvPicPr>
+          <p:cNvPr id="9" name="Picture 8" descr="A black screen with white text&#10;&#10;AI-generated content may be incorrect.">
+            <a:extLst>
+              <a:ext uri="{FF2B5EF4-FFF2-40B4-BE49-F238E27FC236}">
+                <a16:creationId xmlns:a16="http://schemas.microsoft.com/office/drawing/2014/main" id="{AB8D6E77-9797-BD42-D29A-AEE2AE41A5E2}"/>
+              </a:ext>
+            </a:extLst>
+          </p:cNvPr>
+          <p:cNvPicPr>
+            <a:picLocks noChangeAspect="1"/>
+          </p:cNvPicPr>
+          <p:nvPr/>
+        </p:nvPicPr>
+        <p:blipFill>
+          <a:blip r:embed="rId4">
+            <a:extLst>
+              <a:ext uri="{28A0092B-C50C-407E-A947-70E740481C1C}">
+                <a14:useLocalDpi xmlns:a14="http://schemas.microsoft.com/office/drawing/2010/main" val="0"/>
+              </a:ext>
+            </a:extLst>
+          </a:blip>
+          <a:stretch>
+            <a:fillRect/>
+          </a:stretch>
+        </p:blipFill>
+        <p:spPr>
+          <a:xfrm>
+            <a:off x="6195887" y="4426713"/>
+            <a:ext cx="5851321" cy="1433573"/>
+          </a:xfrm>
+          <a:prstGeom prst="rect">
+            <a:avLst/>
+          </a:prstGeom>
+        </p:spPr>
+      </p:pic>
+      <p:sp>
+        <p:nvSpPr>
+          <p:cNvPr id="12" name="Title 1">
+            <a:extLst>
+              <a:ext uri="{FF2B5EF4-FFF2-40B4-BE49-F238E27FC236}">
+                <a16:creationId xmlns:a16="http://schemas.microsoft.com/office/drawing/2014/main" id="{0962BBCC-E5CF-9F32-7F33-64614AA7B2CD}"/>
+              </a:ext>
+            </a:extLst>
+          </p:cNvPr>
+          <p:cNvSpPr>
+            <a:spLocks noGrp="1"/>
+          </p:cNvSpPr>
+          <p:nvPr>
+            <p:ph type="title"/>
+          </p:nvPr>
+        </p:nvSpPr>
+        <p:spPr>
+          <a:xfrm>
+            <a:off x="593111" y="260224"/>
+            <a:ext cx="10653713" cy="1131888"/>
+          </a:xfrm>
+        </p:spPr>
+        <p:txBody>
+          <a:bodyPr vert="horz" lIns="91440" tIns="45720" rIns="91440" bIns="45720" rtlCol="0" anchor="b">
+            <a:normAutofit fontScale="90000"/>
+          </a:bodyPr>
+          <a:lstStyle/>
+          <a:p>
+            <a:pPr algn="ctr"/>
+            <a:r>
+              <a:rPr lang="en-US" sz="4300" dirty="0" err="1"/>
+              <a:t>Resultado</a:t>
+            </a:r>
+            <a:r>
+              <a:rPr lang="en-US" sz="4300" dirty="0"/>
+              <a:t> WAF </a:t>
+            </a:r>
+            <a:br>
+              <a:rPr lang="en-US" sz="4300" dirty="0"/>
+            </a:br>
+            <a:r>
+              <a:rPr lang="en-US" sz="4300" dirty="0"/>
+              <a:t>(Testes com Kali Linux)</a:t>
+            </a:r>
+          </a:p>
+        </p:txBody>
+      </p:sp>
+      <p:sp>
+        <p:nvSpPr>
+          <p:cNvPr id="13" name="TextBox 12">
+            <a:extLst>
+              <a:ext uri="{FF2B5EF4-FFF2-40B4-BE49-F238E27FC236}">
+                <a16:creationId xmlns:a16="http://schemas.microsoft.com/office/drawing/2014/main" id="{80791D8F-B1A1-D7CF-103E-0A98F9BF05C4}"/>
+              </a:ext>
+            </a:extLst>
+          </p:cNvPr>
+          <p:cNvSpPr txBox="1"/>
+          <p:nvPr/>
+        </p:nvSpPr>
+        <p:spPr>
+          <a:xfrm>
+            <a:off x="5072321" y="3558524"/>
+            <a:ext cx="2047355" cy="369332"/>
+          </a:xfrm>
+          <a:prstGeom prst="rect">
+            <a:avLst/>
+          </a:prstGeom>
+        </p:spPr>
+        <p:style>
+          <a:lnRef idx="2">
+            <a:schemeClr val="accent1"/>
+          </a:lnRef>
+          <a:fillRef idx="1">
+            <a:schemeClr val="lt1"/>
+          </a:fillRef>
+          <a:effectRef idx="0">
+            <a:schemeClr val="accent1"/>
+          </a:effectRef>
+          <a:fontRef idx="minor">
+            <a:schemeClr val="dk1"/>
+          </a:fontRef>
+        </p:style>
+        <p:txBody>
+          <a:bodyPr wrap="none" rtlCol="0">
+            <a:spAutoFit/>
+          </a:bodyPr>
+          <a:lstStyle/>
+          <a:p>
+            <a:r>
+              <a:rPr lang="pt-PT" dirty="0" err="1"/>
+              <a:t>Nikto</a:t>
+            </a:r>
+            <a:r>
+              <a:rPr lang="pt-PT" dirty="0"/>
+              <a:t> ao Servidor</a:t>
+            </a:r>
+          </a:p>
+        </p:txBody>
+      </p:sp>
+      <p:sp>
+        <p:nvSpPr>
+          <p:cNvPr id="15" name="TextBox 14">
+            <a:extLst>
+              <a:ext uri="{FF2B5EF4-FFF2-40B4-BE49-F238E27FC236}">
+                <a16:creationId xmlns:a16="http://schemas.microsoft.com/office/drawing/2014/main" id="{35B68B0D-2456-8753-FD00-B5314F3E4157}"/>
+              </a:ext>
+            </a:extLst>
+          </p:cNvPr>
+          <p:cNvSpPr txBox="1"/>
+          <p:nvPr/>
+        </p:nvSpPr>
+        <p:spPr>
+          <a:xfrm>
+            <a:off x="1853740" y="5989811"/>
+            <a:ext cx="2435282" cy="369332"/>
+          </a:xfrm>
+          <a:prstGeom prst="rect">
+            <a:avLst/>
+          </a:prstGeom>
+        </p:spPr>
+        <p:style>
+          <a:lnRef idx="2">
+            <a:schemeClr val="accent1"/>
+          </a:lnRef>
+          <a:fillRef idx="1">
+            <a:schemeClr val="lt1"/>
+          </a:fillRef>
+          <a:effectRef idx="0">
+            <a:schemeClr val="accent1"/>
+          </a:effectRef>
+          <a:fontRef idx="minor">
+            <a:schemeClr val="dk1"/>
+          </a:fontRef>
+        </p:style>
+        <p:txBody>
+          <a:bodyPr wrap="none" rtlCol="0">
+            <a:spAutoFit/>
+          </a:bodyPr>
+          <a:lstStyle/>
+          <a:p>
+            <a:r>
+              <a:rPr lang="pt-PT" dirty="0" err="1"/>
+              <a:t>Nikto</a:t>
+            </a:r>
+            <a:r>
+              <a:rPr lang="pt-PT" dirty="0"/>
+              <a:t> sem Proteções</a:t>
+            </a:r>
+          </a:p>
+        </p:txBody>
+      </p:sp>
+      <p:sp>
+        <p:nvSpPr>
+          <p:cNvPr id="17" name="TextBox 16">
+            <a:extLst>
+              <a:ext uri="{FF2B5EF4-FFF2-40B4-BE49-F238E27FC236}">
+                <a16:creationId xmlns:a16="http://schemas.microsoft.com/office/drawing/2014/main" id="{DA6101CD-8224-5AB0-A012-91337444E548}"/>
+              </a:ext>
+            </a:extLst>
+          </p:cNvPr>
+          <p:cNvSpPr txBox="1"/>
+          <p:nvPr/>
+        </p:nvSpPr>
+        <p:spPr>
+          <a:xfrm>
+            <a:off x="8088417" y="5989811"/>
+            <a:ext cx="2449710" cy="369332"/>
+          </a:xfrm>
+          <a:prstGeom prst="rect">
+            <a:avLst/>
+          </a:prstGeom>
+        </p:spPr>
+        <p:style>
+          <a:lnRef idx="2">
+            <a:schemeClr val="accent1"/>
+          </a:lnRef>
+          <a:fillRef idx="1">
+            <a:schemeClr val="lt1"/>
+          </a:fillRef>
+          <a:effectRef idx="0">
+            <a:schemeClr val="accent1"/>
+          </a:effectRef>
+          <a:fontRef idx="minor">
+            <a:schemeClr val="dk1"/>
+          </a:fontRef>
+        </p:style>
+        <p:txBody>
+          <a:bodyPr wrap="none" rtlCol="0">
+            <a:spAutoFit/>
+          </a:bodyPr>
+          <a:lstStyle/>
+          <a:p>
+            <a:r>
+              <a:rPr lang="pt-PT" dirty="0" err="1"/>
+              <a:t>Nikto</a:t>
+            </a:r>
+            <a:r>
+              <a:rPr lang="pt-PT" dirty="0"/>
+              <a:t> com Proteções</a:t>
+            </a:r>
+          </a:p>
+        </p:txBody>
+      </p:sp>
+    </p:spTree>
+    <p:extLst>
+      <p:ext uri="{BB962C8B-B14F-4D97-AF65-F5344CB8AC3E}">
+        <p14:creationId xmlns:p14="http://schemas.microsoft.com/office/powerpoint/2010/main" val="2007006517"/>
+      </p:ext>
+    </p:extLst>
+  </p:cSld>
+  <p:clrMapOvr>
+    <a:masterClrMapping/>
+  </p:clrMapOvr>
+</p:sld>
+</file>
+
+<file path=ppt/slides/slide17.xml><?xml version="1.0" encoding="utf-8"?>
 <p:sld xmlns:a="http://schemas.openxmlformats.org/drawingml/2006/main" xmlns:r="http://schemas.openxmlformats.org/officeDocument/2006/relationships" xmlns:p="http://schemas.openxmlformats.org/presentationml/2006/main">
   <p:cSld>
     <p:bg>
@@ -11040,7 +11817,7 @@
 </p:sld>
 </file>
 
-<file path=ppt/slides/slide17.xml><?xml version="1.0" encoding="utf-8"?>
+<file path=ppt/slides/slide18.xml><?xml version="1.0" encoding="utf-8"?>
 <p:sld xmlns:a="http://schemas.openxmlformats.org/drawingml/2006/main" xmlns:r="http://schemas.openxmlformats.org/officeDocument/2006/relationships" xmlns:p="http://schemas.openxmlformats.org/presentationml/2006/main">
   <p:cSld>
     <p:bg>

</xml_diff>